<commit_message>
Changed UI for Developer Guide.
</commit_message>
<xml_diff>
--- a/docs/diagrams/UiComponentClassDiagram.pptx
+++ b/docs/diagrams/UiComponentClassDiagram.pptx
@@ -208,7 +208,7 @@
           <a:p>
             <a:fld id="{F5CC4B3F-88C1-4FFA-B1B6-F41C21DC6924}" type="datetimeFigureOut">
               <a:rPr lang="en-US" smtClean="0"/>
-              <a:t>1/7/2017</a:t>
+              <a:t>4/8/17</a:t>
             </a:fld>
             <a:endParaRPr lang="en-US"/>
           </a:p>
@@ -654,7 +654,7 @@
           <a:p>
             <a:fld id="{78C97017-6FC3-485B-9764-EAC9E56C1D49}" type="datetimeFigureOut">
               <a:rPr lang="en-US" smtClean="0"/>
-              <a:t>1/7/2017</a:t>
+              <a:t>4/8/17</a:t>
             </a:fld>
             <a:endParaRPr lang="en-US"/>
           </a:p>
@@ -822,7 +822,7 @@
           <a:p>
             <a:fld id="{78C97017-6FC3-485B-9764-EAC9E56C1D49}" type="datetimeFigureOut">
               <a:rPr lang="en-US" smtClean="0"/>
-              <a:t>1/7/2017</a:t>
+              <a:t>4/8/17</a:t>
             </a:fld>
             <a:endParaRPr lang="en-US"/>
           </a:p>
@@ -1000,7 +1000,7 @@
           <a:p>
             <a:fld id="{78C97017-6FC3-485B-9764-EAC9E56C1D49}" type="datetimeFigureOut">
               <a:rPr lang="en-US" smtClean="0"/>
-              <a:t>1/7/2017</a:t>
+              <a:t>4/8/17</a:t>
             </a:fld>
             <a:endParaRPr lang="en-US"/>
           </a:p>
@@ -1168,7 +1168,7 @@
           <a:p>
             <a:fld id="{78C97017-6FC3-485B-9764-EAC9E56C1D49}" type="datetimeFigureOut">
               <a:rPr lang="en-US" smtClean="0"/>
-              <a:t>1/7/2017</a:t>
+              <a:t>4/8/17</a:t>
             </a:fld>
             <a:endParaRPr lang="en-US"/>
           </a:p>
@@ -1413,7 +1413,7 @@
           <a:p>
             <a:fld id="{78C97017-6FC3-485B-9764-EAC9E56C1D49}" type="datetimeFigureOut">
               <a:rPr lang="en-US" smtClean="0"/>
-              <a:t>1/7/2017</a:t>
+              <a:t>4/8/17</a:t>
             </a:fld>
             <a:endParaRPr lang="en-US"/>
           </a:p>
@@ -1698,7 +1698,7 @@
           <a:p>
             <a:fld id="{78C97017-6FC3-485B-9764-EAC9E56C1D49}" type="datetimeFigureOut">
               <a:rPr lang="en-US" smtClean="0"/>
-              <a:t>1/7/2017</a:t>
+              <a:t>4/8/17</a:t>
             </a:fld>
             <a:endParaRPr lang="en-US"/>
           </a:p>
@@ -2117,7 +2117,7 @@
           <a:p>
             <a:fld id="{78C97017-6FC3-485B-9764-EAC9E56C1D49}" type="datetimeFigureOut">
               <a:rPr lang="en-US" smtClean="0"/>
-              <a:t>1/7/2017</a:t>
+              <a:t>4/8/17</a:t>
             </a:fld>
             <a:endParaRPr lang="en-US"/>
           </a:p>
@@ -2234,7 +2234,7 @@
           <a:p>
             <a:fld id="{78C97017-6FC3-485B-9764-EAC9E56C1D49}" type="datetimeFigureOut">
               <a:rPr lang="en-US" smtClean="0"/>
-              <a:t>1/7/2017</a:t>
+              <a:t>4/8/17</a:t>
             </a:fld>
             <a:endParaRPr lang="en-US"/>
           </a:p>
@@ -2329,7 +2329,7 @@
           <a:p>
             <a:fld id="{78C97017-6FC3-485B-9764-EAC9E56C1D49}" type="datetimeFigureOut">
               <a:rPr lang="en-US" smtClean="0"/>
-              <a:t>1/7/2017</a:t>
+              <a:t>4/8/17</a:t>
             </a:fld>
             <a:endParaRPr lang="en-US"/>
           </a:p>
@@ -2604,7 +2604,7 @@
           <a:p>
             <a:fld id="{78C97017-6FC3-485B-9764-EAC9E56C1D49}" type="datetimeFigureOut">
               <a:rPr lang="en-US" smtClean="0"/>
-              <a:t>1/7/2017</a:t>
+              <a:t>4/8/17</a:t>
             </a:fld>
             <a:endParaRPr lang="en-US"/>
           </a:p>
@@ -2856,7 +2856,7 @@
           <a:p>
             <a:fld id="{78C97017-6FC3-485B-9764-EAC9E56C1D49}" type="datetimeFigureOut">
               <a:rPr lang="en-US" smtClean="0"/>
-              <a:t>1/7/2017</a:t>
+              <a:t>4/8/17</a:t>
             </a:fld>
             <a:endParaRPr lang="en-US"/>
           </a:p>
@@ -3067,7 +3067,7 @@
           <a:p>
             <a:fld id="{78C97017-6FC3-485B-9764-EAC9E56C1D49}" type="datetimeFigureOut">
               <a:rPr lang="en-US" smtClean="0"/>
-              <a:t>1/7/2017</a:t>
+              <a:t>4/8/17</a:t>
             </a:fld>
             <a:endParaRPr lang="en-US"/>
           </a:p>
@@ -3450,8 +3450,8 @@
         </p:nvSpPr>
         <p:spPr>
           <a:xfrm>
-            <a:off x="1217465" y="1447800"/>
-            <a:ext cx="4917083" cy="3962400"/>
+            <a:off x="1066801" y="1447800"/>
+            <a:ext cx="5067748" cy="4267200"/>
           </a:xfrm>
           <a:prstGeom prst="roundRect">
             <a:avLst>
@@ -3918,14 +3918,14 @@
           <a:p>
             <a:pPr algn="ctr"/>
             <a:r>
-              <a:rPr lang="en-US" sz="1050" b="1" dirty="0" err="1">
+              <a:rPr lang="en-US" sz="1050" b="1" dirty="0" smtClean="0">
                 <a:solidFill>
                   <a:schemeClr val="accent3">
                     <a:lumMod val="75000"/>
                   </a:schemeClr>
                 </a:solidFill>
               </a:rPr>
-              <a:t>BrowserPanel</a:t>
+              <a:t>Chart</a:t>
             </a:r>
             <a:endParaRPr lang="en-SG" sz="1050" b="1" dirty="0">
               <a:solidFill>
@@ -3978,14 +3978,14 @@
           <a:p>
             <a:pPr algn="ctr"/>
             <a:r>
-              <a:rPr lang="en-US" sz="1050" b="1" dirty="0" err="1">
+              <a:rPr lang="en-US" sz="1050" b="1" dirty="0" err="1" smtClean="0">
                 <a:solidFill>
                   <a:schemeClr val="accent3">
                     <a:lumMod val="75000"/>
                   </a:schemeClr>
                 </a:solidFill>
               </a:rPr>
-              <a:t>StatusBarFooter</a:t>
+              <a:t>TypeOverview</a:t>
             </a:r>
             <a:endParaRPr lang="en-SG" sz="1050" b="1" dirty="0">
               <a:solidFill>
@@ -4038,14 +4038,14 @@
           <a:p>
             <a:pPr algn="ctr"/>
             <a:r>
-              <a:rPr lang="en-US" sz="1050" b="1" dirty="0" err="1">
+              <a:rPr lang="en-US" sz="1050" b="1" dirty="0" err="1" smtClean="0">
                 <a:solidFill>
                   <a:schemeClr val="accent3">
                     <a:lumMod val="75000"/>
                   </a:schemeClr>
                 </a:solidFill>
               </a:rPr>
-              <a:t>PersonListPanel</a:t>
+              <a:t>TaskListPanel</a:t>
             </a:r>
             <a:endParaRPr lang="en-SG" sz="1050" b="1" dirty="0">
               <a:solidFill>
@@ -4098,14 +4098,14 @@
           <a:p>
             <a:pPr algn="ctr"/>
             <a:r>
-              <a:rPr lang="en-US" sz="1050" b="1" dirty="0" err="1">
+              <a:rPr lang="en-US" sz="1050" b="1" dirty="0" err="1" smtClean="0">
                 <a:solidFill>
                   <a:schemeClr val="accent3">
                     <a:lumMod val="75000"/>
                   </a:schemeClr>
                 </a:solidFill>
               </a:rPr>
-              <a:t>PersonCard</a:t>
+              <a:t>TaskCard</a:t>
             </a:r>
             <a:endParaRPr lang="en-SG" sz="1050" b="1" dirty="0">
               <a:solidFill>
@@ -4125,7 +4125,7 @@
         </p:nvSpPr>
         <p:spPr>
           <a:xfrm>
-            <a:off x="2592528" y="4966000"/>
+            <a:off x="2590798" y="5391557"/>
             <a:ext cx="1093635" cy="236841"/>
           </a:xfrm>
           <a:prstGeom prst="rect">
@@ -4411,56 +4411,13 @@
       <p:cxnSp>
         <p:nvCxnSpPr>
           <p:cNvPr id="50" name="Elbow Connector 63"/>
-          <p:cNvCxnSpPr>
-            <a:stCxn id="39" idx="2"/>
-            <a:endCxn id="35" idx="1"/>
-          </p:cNvCxnSpPr>
+          <p:cNvCxnSpPr/>
           <p:nvPr/>
         </p:nvCxnSpPr>
         <p:spPr>
           <a:xfrm rot="16200000" flipH="1">
-            <a:off x="1597249" y="3686901"/>
+            <a:off x="1595520" y="3706060"/>
             <a:ext cx="1814155" cy="176401"/>
-          </a:xfrm>
-          <a:prstGeom prst="bentConnector2">
-            <a:avLst/>
-          </a:prstGeom>
-          <a:ln w="19050">
-            <a:solidFill>
-              <a:schemeClr val="accent3"/>
-            </a:solidFill>
-            <a:headEnd type="none" w="med" len="med"/>
-            <a:tailEnd type="arrow" w="med" len="med"/>
-          </a:ln>
-          <a:effectLst/>
-        </p:spPr>
-        <p:style>
-          <a:lnRef idx="1">
-            <a:schemeClr val="accent2"/>
-          </a:lnRef>
-          <a:fillRef idx="2">
-            <a:schemeClr val="accent2"/>
-          </a:fillRef>
-          <a:effectRef idx="1">
-            <a:schemeClr val="accent2"/>
-          </a:effectRef>
-          <a:fontRef idx="minor">
-            <a:schemeClr val="dk1"/>
-          </a:fontRef>
-        </p:style>
-      </p:cxnSp>
-      <p:cxnSp>
-        <p:nvCxnSpPr>
-          <p:cNvPr id="53" name="Elbow Connector 63"/>
-          <p:cNvCxnSpPr>
-            <a:endCxn id="38" idx="1"/>
-          </p:cNvCxnSpPr>
-          <p:nvPr/>
-        </p:nvCxnSpPr>
-        <p:spPr>
-          <a:xfrm rot="16200000" flipH="1">
-            <a:off x="1184119" y="3676012"/>
-            <a:ext cx="2396440" cy="420377"/>
           </a:xfrm>
           <a:prstGeom prst="bentConnector2">
             <a:avLst/>
@@ -4653,25 +4610,25 @@
       <p:cxnSp>
         <p:nvCxnSpPr>
           <p:cNvPr id="82" name="Elbow Connector 63"/>
-          <p:cNvCxnSpPr>
-            <a:stCxn id="16" idx="3"/>
-            <a:endCxn id="34" idx="3"/>
-          </p:cNvCxnSpPr>
+          <p:cNvCxnSpPr/>
           <p:nvPr/>
         </p:nvCxnSpPr>
         <p:spPr>
-          <a:xfrm rot="5400000">
-            <a:off x="3867176" y="2104987"/>
-            <a:ext cx="1481780" cy="1843806"/>
-          </a:xfrm>
-          <a:prstGeom prst="bentConnector2">
-            <a:avLst/>
+          <a:xfrm rot="10800000">
+            <a:off x="3686164" y="3790276"/>
+            <a:ext cx="3070830" cy="660722"/>
+          </a:xfrm>
+          <a:prstGeom prst="bentConnector3">
+            <a:avLst>
+              <a:gd name="adj1" fmla="val 50000"/>
+            </a:avLst>
           </a:prstGeom>
-          <a:ln w="6350">
+          <a:ln w="19050">
             <a:solidFill>
               <a:schemeClr val="accent3"/>
             </a:solidFill>
-            <a:headEnd type="none" w="med" len="med"/>
+            <a:prstDash val="sysDot"/>
+            <a:headEnd type="arrow" w="med" len="med"/>
             <a:tailEnd type="none" w="med" len="med"/>
           </a:ln>
           <a:effectLst/>
@@ -4784,8 +4741,8 @@
         </p:nvCxnSpPr>
         <p:spPr>
           <a:xfrm rot="5400000">
-            <a:off x="3208856" y="2763307"/>
-            <a:ext cx="2798421" cy="1843806"/>
+            <a:off x="2995212" y="2975221"/>
+            <a:ext cx="3223978" cy="1845536"/>
           </a:xfrm>
           <a:prstGeom prst="bentConnector2">
             <a:avLst/>
@@ -5509,6 +5466,187 @@
           </a:p>
         </p:txBody>
       </p:sp>
+      <p:cxnSp>
+        <p:nvCxnSpPr>
+          <p:cNvPr id="51" name="Elbow Connector 63"/>
+          <p:cNvCxnSpPr>
+            <a:endCxn id="38" idx="1"/>
+          </p:cNvCxnSpPr>
+          <p:nvPr/>
+        </p:nvCxnSpPr>
+        <p:spPr>
+          <a:xfrm rot="16200000" flipH="1">
+            <a:off x="979264" y="3898444"/>
+            <a:ext cx="2803524" cy="419544"/>
+          </a:xfrm>
+          <a:prstGeom prst="bentConnector2">
+            <a:avLst/>
+          </a:prstGeom>
+          <a:ln w="19050">
+            <a:solidFill>
+              <a:schemeClr val="accent3"/>
+            </a:solidFill>
+            <a:headEnd type="none" w="med" len="med"/>
+            <a:tailEnd type="arrow" w="med" len="med"/>
+          </a:ln>
+          <a:effectLst/>
+        </p:spPr>
+        <p:style>
+          <a:lnRef idx="1">
+            <a:schemeClr val="accent2"/>
+          </a:lnRef>
+          <a:fillRef idx="2">
+            <a:schemeClr val="accent2"/>
+          </a:fillRef>
+          <a:effectRef idx="1">
+            <a:schemeClr val="accent2"/>
+          </a:effectRef>
+          <a:fontRef idx="minor">
+            <a:schemeClr val="dk1"/>
+          </a:fontRef>
+        </p:style>
+      </p:cxnSp>
+      <p:cxnSp>
+        <p:nvCxnSpPr>
+          <p:cNvPr id="57" name="Elbow Connector 63"/>
+          <p:cNvCxnSpPr>
+            <a:endCxn id="59" idx="1"/>
+          </p:cNvCxnSpPr>
+          <p:nvPr/>
+        </p:nvCxnSpPr>
+        <p:spPr>
+          <a:xfrm rot="16200000" flipH="1">
+            <a:off x="1493874" y="4028353"/>
+            <a:ext cx="2018630" cy="179313"/>
+          </a:xfrm>
+          <a:prstGeom prst="bentConnector2">
+            <a:avLst/>
+          </a:prstGeom>
+          <a:ln w="19050">
+            <a:solidFill>
+              <a:schemeClr val="accent3"/>
+            </a:solidFill>
+            <a:headEnd type="none" w="med" len="med"/>
+            <a:tailEnd type="arrow" w="med" len="med"/>
+          </a:ln>
+          <a:effectLst/>
+        </p:spPr>
+        <p:style>
+          <a:lnRef idx="1">
+            <a:schemeClr val="accent2"/>
+          </a:lnRef>
+          <a:fillRef idx="2">
+            <a:schemeClr val="accent2"/>
+          </a:fillRef>
+          <a:effectRef idx="1">
+            <a:schemeClr val="accent2"/>
+          </a:effectRef>
+          <a:fontRef idx="minor">
+            <a:schemeClr val="dk1"/>
+          </a:fontRef>
+        </p:style>
+      </p:cxnSp>
+      <p:sp>
+        <p:nvSpPr>
+          <p:cNvPr id="59" name="Rectangle 11"/>
+          <p:cNvSpPr/>
+          <p:nvPr/>
+        </p:nvSpPr>
+        <p:spPr>
+          <a:xfrm>
+            <a:off x="2592846" y="5008904"/>
+            <a:ext cx="1093635" cy="236841"/>
+          </a:xfrm>
+          <a:prstGeom prst="rect">
+            <a:avLst/>
+          </a:prstGeom>
+          <a:ln w="19050">
+            <a:solidFill>
+              <a:schemeClr val="accent3"/>
+            </a:solidFill>
+          </a:ln>
+          <a:effectLst/>
+        </p:spPr>
+        <p:style>
+          <a:lnRef idx="1">
+            <a:schemeClr val="accent3"/>
+          </a:lnRef>
+          <a:fillRef idx="2">
+            <a:schemeClr val="accent3"/>
+          </a:fillRef>
+          <a:effectRef idx="1">
+            <a:schemeClr val="accent3"/>
+          </a:effectRef>
+          <a:fontRef idx="minor">
+            <a:schemeClr val="dk1"/>
+          </a:fontRef>
+        </p:style>
+        <p:txBody>
+          <a:bodyPr rtlCol="0" anchor="ctr"/>
+          <a:lstStyle/>
+          <a:p>
+            <a:pPr algn="ctr"/>
+            <a:r>
+              <a:rPr lang="en-US" sz="1050" b="1" dirty="0" smtClean="0">
+                <a:solidFill>
+                  <a:schemeClr val="accent3">
+                    <a:lumMod val="75000"/>
+                  </a:schemeClr>
+                </a:solidFill>
+              </a:rPr>
+              <a:t>Quotes</a:t>
+            </a:r>
+            <a:endParaRPr lang="en-SG" sz="1050" b="1" dirty="0">
+              <a:solidFill>
+                <a:schemeClr val="accent3">
+                  <a:lumMod val="75000"/>
+                </a:schemeClr>
+              </a:solidFill>
+            </a:endParaRPr>
+          </a:p>
+        </p:txBody>
+      </p:sp>
+      <p:cxnSp>
+        <p:nvCxnSpPr>
+          <p:cNvPr id="63" name="Elbow Connector 63"/>
+          <p:cNvCxnSpPr>
+            <a:stCxn id="16" idx="3"/>
+            <a:endCxn id="59" idx="3"/>
+          </p:cNvCxnSpPr>
+          <p:nvPr/>
+        </p:nvCxnSpPr>
+        <p:spPr>
+          <a:xfrm rot="5400000">
+            <a:off x="3187563" y="2784918"/>
+            <a:ext cx="2841325" cy="1843488"/>
+          </a:xfrm>
+          <a:prstGeom prst="bentConnector2">
+            <a:avLst/>
+          </a:prstGeom>
+          <a:ln w="6350">
+            <a:solidFill>
+              <a:schemeClr val="accent3"/>
+            </a:solidFill>
+            <a:headEnd type="none" w="med" len="med"/>
+            <a:tailEnd type="none" w="med" len="med"/>
+          </a:ln>
+          <a:effectLst/>
+        </p:spPr>
+        <p:style>
+          <a:lnRef idx="1">
+            <a:schemeClr val="accent2"/>
+          </a:lnRef>
+          <a:fillRef idx="2">
+            <a:schemeClr val="accent2"/>
+          </a:fillRef>
+          <a:effectRef idx="1">
+            <a:schemeClr val="accent2"/>
+          </a:effectRef>
+          <a:fontRef idx="minor">
+            <a:schemeClr val="dk1"/>
+          </a:fontRef>
+        </p:style>
+      </p:cxnSp>
     </p:spTree>
     <p:extLst>
       <p:ext uri="{BB962C8B-B14F-4D97-AF65-F5344CB8AC3E}">

</xml_diff>

<commit_message>
Edited UIComponentClassDiagram.pptx. Forgot to add some elements.
</commit_message>
<xml_diff>
--- a/docs/diagrams/UiComponentClassDiagram.pptx
+++ b/docs/diagrams/UiComponentClassDiagram.pptx
@@ -3450,8 +3450,8 @@
         </p:nvSpPr>
         <p:spPr>
           <a:xfrm>
-            <a:off x="1066801" y="1447800"/>
-            <a:ext cx="5067748" cy="4267200"/>
+            <a:off x="1066800" y="1447800"/>
+            <a:ext cx="5257799" cy="4724400"/>
           </a:xfrm>
           <a:prstGeom prst="roundRect">
             <a:avLst>
@@ -4125,7 +4125,7 @@
         </p:nvSpPr>
         <p:spPr>
           <a:xfrm>
-            <a:off x="2590798" y="5391557"/>
+            <a:off x="2590800" y="5755096"/>
             <a:ext cx="1093635" cy="236841"/>
           </a:xfrm>
           <a:prstGeom prst="rect">
@@ -4609,47 +4609,6 @@
       </p:cxnSp>
       <p:cxnSp>
         <p:nvCxnSpPr>
-          <p:cNvPr id="82" name="Elbow Connector 63"/>
-          <p:cNvCxnSpPr/>
-          <p:nvPr/>
-        </p:nvCxnSpPr>
-        <p:spPr>
-          <a:xfrm rot="10800000">
-            <a:off x="3686164" y="3790276"/>
-            <a:ext cx="3070830" cy="660722"/>
-          </a:xfrm>
-          <a:prstGeom prst="bentConnector3">
-            <a:avLst>
-              <a:gd name="adj1" fmla="val 50000"/>
-            </a:avLst>
-          </a:prstGeom>
-          <a:ln w="19050">
-            <a:solidFill>
-              <a:schemeClr val="accent3"/>
-            </a:solidFill>
-            <a:prstDash val="sysDot"/>
-            <a:headEnd type="arrow" w="med" len="med"/>
-            <a:tailEnd type="none" w="med" len="med"/>
-          </a:ln>
-          <a:effectLst/>
-        </p:spPr>
-        <p:style>
-          <a:lnRef idx="1">
-            <a:schemeClr val="accent2"/>
-          </a:lnRef>
-          <a:fillRef idx="2">
-            <a:schemeClr val="accent2"/>
-          </a:fillRef>
-          <a:effectRef idx="1">
-            <a:schemeClr val="accent2"/>
-          </a:effectRef>
-          <a:fontRef idx="minor">
-            <a:schemeClr val="dk1"/>
-          </a:fontRef>
-        </p:style>
-      </p:cxnSp>
-      <p:cxnSp>
-        <p:nvCxnSpPr>
           <p:cNvPr id="88" name="Elbow Connector 63"/>
           <p:cNvCxnSpPr>
             <a:stCxn id="2" idx="3"/>
@@ -4693,24 +4652,28 @@
         <p:nvCxnSpPr>
           <p:cNvPr id="91" name="Elbow Connector 63"/>
           <p:cNvCxnSpPr>
-            <a:stCxn id="16" idx="3"/>
-            <a:endCxn id="35" idx="3"/>
+            <a:stCxn id="117" idx="0"/>
+            <a:endCxn id="35" idx="2"/>
           </p:cNvCxnSpPr>
           <p:nvPr/>
         </p:nvCxnSpPr>
         <p:spPr>
-          <a:xfrm rot="5400000">
-            <a:off x="3409976" y="2562187"/>
-            <a:ext cx="2396180" cy="1843807"/>
-          </a:xfrm>
-          <a:prstGeom prst="bentConnector2">
-            <a:avLst/>
+          <a:xfrm rot="10800000" flipV="1">
+            <a:off x="3139346" y="4724398"/>
+            <a:ext cx="3596171" cy="76202"/>
+          </a:xfrm>
+          <a:prstGeom prst="bentConnector4">
+            <a:avLst>
+              <a:gd name="adj1" fmla="val 26102"/>
+              <a:gd name="adj2" fmla="val 248580"/>
+            </a:avLst>
           </a:prstGeom>
-          <a:ln w="6350">
+          <a:ln w="19050">
             <a:solidFill>
               <a:schemeClr val="accent3"/>
             </a:solidFill>
-            <a:headEnd type="none" w="med" len="med"/>
+            <a:prstDash val="sysDot"/>
+            <a:headEnd type="arrow" w="med" len="med"/>
             <a:tailEnd type="none" w="med" len="med"/>
           </a:ln>
           <a:effectLst/>
@@ -4741,8 +4704,8 @@
         </p:nvCxnSpPr>
         <p:spPr>
           <a:xfrm rot="5400000">
-            <a:off x="2995212" y="2975221"/>
-            <a:ext cx="3223978" cy="1845536"/>
+            <a:off x="2813444" y="3156991"/>
+            <a:ext cx="3587517" cy="1845534"/>
           </a:xfrm>
           <a:prstGeom prst="bentConnector2">
             <a:avLst/>
@@ -5476,8 +5439,8 @@
         </p:nvCxnSpPr>
         <p:spPr>
           <a:xfrm rot="16200000" flipH="1">
-            <a:off x="979264" y="3898444"/>
-            <a:ext cx="2803524" cy="419544"/>
+            <a:off x="797496" y="4080212"/>
+            <a:ext cx="3167063" cy="419546"/>
           </a:xfrm>
           <a:prstGeom prst="bentConnector2">
             <a:avLst/>
@@ -5587,6 +5550,151 @@
           <a:p>
             <a:pPr algn="ctr"/>
             <a:r>
+              <a:rPr lang="en-US" sz="1050" b="1" dirty="0" err="1" smtClean="0">
+                <a:solidFill>
+                  <a:schemeClr val="accent3">
+                    <a:lumMod val="75000"/>
+                  </a:schemeClr>
+                </a:solidFill>
+              </a:rPr>
+              <a:t>TaskCounter</a:t>
+            </a:r>
+            <a:endParaRPr lang="en-SG" sz="1050" b="1" dirty="0">
+              <a:solidFill>
+                <a:schemeClr val="accent3">
+                  <a:lumMod val="75000"/>
+                </a:schemeClr>
+              </a:solidFill>
+            </a:endParaRPr>
+          </a:p>
+        </p:txBody>
+      </p:sp>
+      <p:cxnSp>
+        <p:nvCxnSpPr>
+          <p:cNvPr id="63" name="Elbow Connector 63"/>
+          <p:cNvCxnSpPr>
+            <a:endCxn id="59" idx="2"/>
+          </p:cNvCxnSpPr>
+          <p:nvPr/>
+        </p:nvCxnSpPr>
+        <p:spPr>
+          <a:xfrm rot="10800000" flipV="1">
+            <a:off x="3139665" y="4856091"/>
+            <a:ext cx="3595851" cy="389654"/>
+          </a:xfrm>
+          <a:prstGeom prst="bentConnector4">
+            <a:avLst>
+              <a:gd name="adj1" fmla="val 24314"/>
+              <a:gd name="adj2" fmla="val 122163"/>
+            </a:avLst>
+          </a:prstGeom>
+          <a:ln w="19050">
+            <a:solidFill>
+              <a:schemeClr val="accent3"/>
+            </a:solidFill>
+            <a:prstDash val="sysDot"/>
+            <a:headEnd type="arrow" w="med" len="med"/>
+            <a:tailEnd type="none" w="med" len="med"/>
+          </a:ln>
+          <a:effectLst/>
+        </p:spPr>
+        <p:style>
+          <a:lnRef idx="1">
+            <a:schemeClr val="accent2"/>
+          </a:lnRef>
+          <a:fillRef idx="2">
+            <a:schemeClr val="accent2"/>
+          </a:fillRef>
+          <a:effectRef idx="1">
+            <a:schemeClr val="accent2"/>
+          </a:effectRef>
+          <a:fontRef idx="minor">
+            <a:schemeClr val="dk1"/>
+          </a:fontRef>
+        </p:style>
+      </p:cxnSp>
+      <p:cxnSp>
+        <p:nvCxnSpPr>
+          <p:cNvPr id="48" name="Elbow Connector 63"/>
+          <p:cNvCxnSpPr>
+            <a:stCxn id="39" idx="2"/>
+            <a:endCxn id="52" idx="1"/>
+          </p:cNvCxnSpPr>
+          <p:nvPr/>
+        </p:nvCxnSpPr>
+        <p:spPr>
+          <a:xfrm rot="16200000" flipH="1">
+            <a:off x="1179245" y="4104905"/>
+            <a:ext cx="2648955" cy="175193"/>
+          </a:xfrm>
+          <a:prstGeom prst="bentConnector2">
+            <a:avLst/>
+          </a:prstGeom>
+          <a:ln w="19050">
+            <a:solidFill>
+              <a:schemeClr val="accent3"/>
+            </a:solidFill>
+            <a:headEnd type="none" w="med" len="med"/>
+            <a:tailEnd type="arrow" w="med" len="med"/>
+          </a:ln>
+          <a:effectLst/>
+        </p:spPr>
+        <p:style>
+          <a:lnRef idx="1">
+            <a:schemeClr val="accent2"/>
+          </a:lnRef>
+          <a:fillRef idx="2">
+            <a:schemeClr val="accent2"/>
+          </a:fillRef>
+          <a:effectRef idx="1">
+            <a:schemeClr val="accent2"/>
+          </a:effectRef>
+          <a:fontRef idx="minor">
+            <a:schemeClr val="dk1"/>
+          </a:fontRef>
+        </p:style>
+      </p:cxnSp>
+      <p:sp>
+        <p:nvSpPr>
+          <p:cNvPr id="52" name="Rectangle 11"/>
+          <p:cNvSpPr/>
+          <p:nvPr/>
+        </p:nvSpPr>
+        <p:spPr>
+          <a:xfrm>
+            <a:off x="2591319" y="5398559"/>
+            <a:ext cx="1093635" cy="236841"/>
+          </a:xfrm>
+          <a:prstGeom prst="rect">
+            <a:avLst/>
+          </a:prstGeom>
+          <a:ln w="19050">
+            <a:solidFill>
+              <a:schemeClr val="accent3"/>
+            </a:solidFill>
+          </a:ln>
+          <a:effectLst/>
+        </p:spPr>
+        <p:style>
+          <a:lnRef idx="1">
+            <a:schemeClr val="accent3"/>
+          </a:lnRef>
+          <a:fillRef idx="2">
+            <a:schemeClr val="accent3"/>
+          </a:fillRef>
+          <a:effectRef idx="1">
+            <a:schemeClr val="accent3"/>
+          </a:effectRef>
+          <a:fontRef idx="minor">
+            <a:schemeClr val="dk1"/>
+          </a:fontRef>
+        </p:style>
+        <p:txBody>
+          <a:bodyPr rtlCol="0" anchor="ctr"/>
+          <a:lstStyle/>
+          <a:p>
+            <a:pPr algn="ctr"/>
+            <a:r>
               <a:rPr lang="en-US" sz="1050" b="1" dirty="0" smtClean="0">
                 <a:solidFill>
                   <a:schemeClr val="accent3">
@@ -5608,7 +5716,48 @@
       </p:sp>
       <p:cxnSp>
         <p:nvCxnSpPr>
-          <p:cNvPr id="63" name="Elbow Connector 63"/>
+          <p:cNvPr id="72" name="Elbow Connector 63"/>
+          <p:cNvCxnSpPr/>
+          <p:nvPr/>
+        </p:nvCxnSpPr>
+        <p:spPr>
+          <a:xfrm rot="10800000">
+            <a:off x="3137618" y="3907947"/>
+            <a:ext cx="3619377" cy="502999"/>
+          </a:xfrm>
+          <a:prstGeom prst="bentConnector3">
+            <a:avLst>
+              <a:gd name="adj1" fmla="val 26701"/>
+            </a:avLst>
+          </a:prstGeom>
+          <a:ln w="19050">
+            <a:solidFill>
+              <a:schemeClr val="accent3"/>
+            </a:solidFill>
+            <a:prstDash val="sysDot"/>
+            <a:headEnd type="arrow" w="med" len="med"/>
+            <a:tailEnd type="none" w="med" len="med"/>
+          </a:ln>
+          <a:effectLst/>
+        </p:spPr>
+        <p:style>
+          <a:lnRef idx="1">
+            <a:schemeClr val="accent2"/>
+          </a:lnRef>
+          <a:fillRef idx="2">
+            <a:schemeClr val="accent2"/>
+          </a:fillRef>
+          <a:effectRef idx="1">
+            <a:schemeClr val="accent2"/>
+          </a:effectRef>
+          <a:fontRef idx="minor">
+            <a:schemeClr val="dk1"/>
+          </a:fontRef>
+        </p:style>
+      </p:cxnSp>
+      <p:cxnSp>
+        <p:nvCxnSpPr>
+          <p:cNvPr id="78" name="Elbow Connector 63"/>
           <p:cNvCxnSpPr>
             <a:stCxn id="16" idx="3"/>
             <a:endCxn id="59" idx="3"/>
@@ -5619,6 +5768,89 @@
           <a:xfrm rot="5400000">
             <a:off x="3187563" y="2784918"/>
             <a:ext cx="2841325" cy="1843488"/>
+          </a:xfrm>
+          <a:prstGeom prst="bentConnector2">
+            <a:avLst/>
+          </a:prstGeom>
+          <a:ln w="6350">
+            <a:solidFill>
+              <a:schemeClr val="accent3"/>
+            </a:solidFill>
+            <a:headEnd type="none" w="med" len="med"/>
+            <a:tailEnd type="none" w="med" len="med"/>
+          </a:ln>
+          <a:effectLst/>
+        </p:spPr>
+        <p:style>
+          <a:lnRef idx="1">
+            <a:schemeClr val="accent2"/>
+          </a:lnRef>
+          <a:fillRef idx="2">
+            <a:schemeClr val="accent2"/>
+          </a:fillRef>
+          <a:effectRef idx="1">
+            <a:schemeClr val="accent2"/>
+          </a:effectRef>
+          <a:fontRef idx="minor">
+            <a:schemeClr val="dk1"/>
+          </a:fontRef>
+        </p:style>
+      </p:cxnSp>
+      <p:cxnSp>
+        <p:nvCxnSpPr>
+          <p:cNvPr id="81" name="Elbow Connector 63"/>
+          <p:cNvCxnSpPr>
+            <a:endCxn id="16" idx="3"/>
+          </p:cNvCxnSpPr>
+          <p:nvPr/>
+        </p:nvCxnSpPr>
+        <p:spPr>
+          <a:xfrm rot="5400000" flipH="1" flipV="1">
+            <a:off x="3400501" y="2580754"/>
+            <a:ext cx="2424222" cy="1834714"/>
+          </a:xfrm>
+          <a:prstGeom prst="bentConnector3">
+            <a:avLst>
+              <a:gd name="adj1" fmla="val 127"/>
+            </a:avLst>
+          </a:prstGeom>
+          <a:ln w="6350">
+            <a:solidFill>
+              <a:schemeClr val="accent3"/>
+            </a:solidFill>
+            <a:headEnd type="none" w="med" len="med"/>
+            <a:tailEnd type="none" w="med" len="med"/>
+          </a:ln>
+          <a:effectLst/>
+        </p:spPr>
+        <p:style>
+          <a:lnRef idx="1">
+            <a:schemeClr val="accent2"/>
+          </a:lnRef>
+          <a:fillRef idx="2">
+            <a:schemeClr val="accent2"/>
+          </a:fillRef>
+          <a:effectRef idx="1">
+            <a:schemeClr val="accent2"/>
+          </a:effectRef>
+          <a:fontRef idx="minor">
+            <a:schemeClr val="dk1"/>
+          </a:fontRef>
+        </p:style>
+      </p:cxnSp>
+      <p:cxnSp>
+        <p:nvCxnSpPr>
+          <p:cNvPr id="89" name="Elbow Connector 63"/>
+          <p:cNvCxnSpPr>
+            <a:stCxn id="16" idx="3"/>
+            <a:endCxn id="34" idx="3"/>
+          </p:cNvCxnSpPr>
+          <p:nvPr/>
+        </p:nvCxnSpPr>
+        <p:spPr>
+          <a:xfrm rot="5400000">
+            <a:off x="3867176" y="2104987"/>
+            <a:ext cx="1481780" cy="1843806"/>
           </a:xfrm>
           <a:prstGeom prst="bentConnector2">
             <a:avLst/>

</xml_diff>